<commit_message>
ajout de css de header et main
</commit_message>
<xml_diff>
--- a/assets/Maquettes/Maquette dreamglow page d'acceuil.pptx
+++ b/assets/Maquettes/Maquette dreamglow page d'acceuil.pptx
@@ -159,7 +159,7 @@
           </a:lstStyle>
           <a:p>
             <a:r>
-              <a:rPr lang="fr-FR" smtClean="0"/>
+              <a:rPr lang="fr-FR"/>
               <a:t>Modifiez le style du titre</a:t>
             </a:r>
             <a:endParaRPr lang="en-US" dirty="0"/>
@@ -279,7 +279,7 @@
           </a:lstStyle>
           <a:p>
             <a:r>
-              <a:rPr lang="fr-FR" smtClean="0"/>
+              <a:rPr lang="fr-FR"/>
               <a:t>Modifiez le style des sous-titres du masque</a:t>
             </a:r>
             <a:endParaRPr lang="en-US" dirty="0"/>
@@ -303,7 +303,7 @@
           <a:p>
             <a:fld id="{57623296-6700-4D43-8DD2-BC28E9463D46}" type="datetimeFigureOut">
               <a:rPr lang="fr-FR" smtClean="0"/>
-              <a:t>01/03/2024</a:t>
+              <a:t>12/03/2024</a:t>
             </a:fld>
             <a:endParaRPr lang="fr-FR"/>
           </a:p>
@@ -408,7 +408,7 @@
           </a:lstStyle>
           <a:p>
             <a:r>
-              <a:rPr lang="fr-FR" smtClean="0"/>
+              <a:rPr lang="fr-FR"/>
               <a:t>Modifiez le style du titre</a:t>
             </a:r>
             <a:endParaRPr lang="en-US" dirty="0"/>
@@ -487,7 +487,7 @@
           </a:lstStyle>
           <a:p>
             <a:r>
-              <a:rPr lang="fr-FR" smtClean="0"/>
+              <a:rPr lang="fr-FR"/>
               <a:t>Cliquez sur l'icône pour ajouter une image</a:t>
             </a:r>
             <a:endParaRPr lang="en-US" dirty="0"/>
@@ -555,7 +555,7 @@
           <a:p>
             <a:pPr lvl="0"/>
             <a:r>
-              <a:rPr lang="fr-FR" smtClean="0"/>
+              <a:rPr lang="fr-FR"/>
               <a:t>Modifiez les styles du texte du masque</a:t>
             </a:r>
           </a:p>
@@ -578,7 +578,7 @@
           <a:p>
             <a:fld id="{57623296-6700-4D43-8DD2-BC28E9463D46}" type="datetimeFigureOut">
               <a:rPr lang="fr-FR" smtClean="0"/>
-              <a:t>01/03/2024</a:t>
+              <a:t>12/03/2024</a:t>
             </a:fld>
             <a:endParaRPr lang="fr-FR"/>
           </a:p>
@@ -681,7 +681,7 @@
           </a:lstStyle>
           <a:p>
             <a:r>
-              <a:rPr lang="fr-FR" smtClean="0"/>
+              <a:rPr lang="fr-FR"/>
               <a:t>Modifiez le style du titre</a:t>
             </a:r>
             <a:endParaRPr lang="en-US" dirty="0"/>
@@ -749,7 +749,7 @@
           <a:p>
             <a:pPr lvl="0"/>
             <a:r>
-              <a:rPr lang="fr-FR" smtClean="0"/>
+              <a:rPr lang="fr-FR"/>
               <a:t>Modifiez les styles du texte du masque</a:t>
             </a:r>
           </a:p>
@@ -772,7 +772,7 @@
           <a:p>
             <a:fld id="{57623296-6700-4D43-8DD2-BC28E9463D46}" type="datetimeFigureOut">
               <a:rPr lang="fr-FR" smtClean="0"/>
-              <a:t>01/03/2024</a:t>
+              <a:t>12/03/2024</a:t>
             </a:fld>
             <a:endParaRPr lang="fr-FR"/>
           </a:p>
@@ -875,7 +875,7 @@
           </a:lstStyle>
           <a:p>
             <a:r>
-              <a:rPr lang="fr-FR" smtClean="0"/>
+              <a:rPr lang="fr-FR"/>
               <a:t>Modifiez le style du titre</a:t>
             </a:r>
             <a:endParaRPr lang="en-US" dirty="0"/>
@@ -955,7 +955,7 @@
               <a:buNone/>
             </a:pPr>
             <a:r>
-              <a:rPr lang="fr-FR" smtClean="0"/>
+              <a:rPr lang="fr-FR"/>
               <a:t>Modifiez les styles du texte du masque</a:t>
             </a:r>
           </a:p>
@@ -1022,7 +1022,7 @@
           <a:p>
             <a:pPr lvl="0"/>
             <a:r>
-              <a:rPr lang="fr-FR" smtClean="0"/>
+              <a:rPr lang="fr-FR"/>
               <a:t>Modifiez les styles du texte du masque</a:t>
             </a:r>
           </a:p>
@@ -1045,7 +1045,7 @@
           <a:p>
             <a:fld id="{57623296-6700-4D43-8DD2-BC28E9463D46}" type="datetimeFigureOut">
               <a:rPr lang="fr-FR" smtClean="0"/>
-              <a:t>01/03/2024</a:t>
+              <a:t>12/03/2024</a:t>
             </a:fld>
             <a:endParaRPr lang="fr-FR"/>
           </a:p>
@@ -1242,7 +1242,7 @@
           </a:lstStyle>
           <a:p>
             <a:r>
-              <a:rPr lang="fr-FR" smtClean="0"/>
+              <a:rPr lang="fr-FR"/>
               <a:t>Modifiez le style du titre</a:t>
             </a:r>
             <a:endParaRPr lang="en-US" dirty="0"/>
@@ -1363,7 +1363,7 @@
           <a:p>
             <a:pPr lvl="0"/>
             <a:r>
-              <a:rPr lang="fr-FR" smtClean="0"/>
+              <a:rPr lang="fr-FR"/>
               <a:t>Modifiez les styles du texte du masque</a:t>
             </a:r>
           </a:p>
@@ -1386,7 +1386,7 @@
           <a:p>
             <a:fld id="{57623296-6700-4D43-8DD2-BC28E9463D46}" type="datetimeFigureOut">
               <a:rPr lang="fr-FR" smtClean="0"/>
-              <a:t>01/03/2024</a:t>
+              <a:t>12/03/2024</a:t>
             </a:fld>
             <a:endParaRPr lang="fr-FR"/>
           </a:p>
@@ -1484,7 +1484,7 @@
           </a:lstStyle>
           <a:p>
             <a:r>
-              <a:rPr lang="fr-FR" smtClean="0"/>
+              <a:rPr lang="fr-FR"/>
               <a:t>Modifiez le style du titre</a:t>
             </a:r>
             <a:endParaRPr lang="en-US" dirty="0"/>
@@ -1559,7 +1559,7 @@
           <a:p>
             <a:pPr lvl="0"/>
             <a:r>
-              <a:rPr lang="fr-FR" smtClean="0"/>
+              <a:rPr lang="fr-FR"/>
               <a:t>Modifiez les styles du texte du masque</a:t>
             </a:r>
           </a:p>
@@ -1626,7 +1626,7 @@
           <a:p>
             <a:pPr lvl="0"/>
             <a:r>
-              <a:rPr lang="fr-FR" smtClean="0"/>
+              <a:rPr lang="fr-FR"/>
               <a:t>Modifiez les styles du texte du masque</a:t>
             </a:r>
           </a:p>
@@ -1700,7 +1700,7 @@
           <a:p>
             <a:pPr lvl="0"/>
             <a:r>
-              <a:rPr lang="fr-FR" smtClean="0"/>
+              <a:rPr lang="fr-FR"/>
               <a:t>Modifiez les styles du texte du masque</a:t>
             </a:r>
           </a:p>
@@ -1767,7 +1767,7 @@
           <a:p>
             <a:pPr lvl="0"/>
             <a:r>
-              <a:rPr lang="fr-FR" smtClean="0"/>
+              <a:rPr lang="fr-FR"/>
               <a:t>Modifiez les styles du texte du masque</a:t>
             </a:r>
           </a:p>
@@ -1841,7 +1841,7 @@
           <a:p>
             <a:pPr lvl="0"/>
             <a:r>
-              <a:rPr lang="fr-FR" smtClean="0"/>
+              <a:rPr lang="fr-FR"/>
               <a:t>Modifiez les styles du texte du masque</a:t>
             </a:r>
           </a:p>
@@ -1908,7 +1908,7 @@
           <a:p>
             <a:pPr lvl="0"/>
             <a:r>
-              <a:rPr lang="fr-FR" smtClean="0"/>
+              <a:rPr lang="fr-FR"/>
               <a:t>Modifiez les styles du texte du masque</a:t>
             </a:r>
           </a:p>
@@ -2009,7 +2009,7 @@
           <a:p>
             <a:fld id="{57623296-6700-4D43-8DD2-BC28E9463D46}" type="datetimeFigureOut">
               <a:rPr lang="fr-FR" smtClean="0"/>
-              <a:t>01/03/2024</a:t>
+              <a:t>12/03/2024</a:t>
             </a:fld>
             <a:endParaRPr lang="fr-FR"/>
           </a:p>
@@ -2107,7 +2107,7 @@
           </a:lstStyle>
           <a:p>
             <a:r>
-              <a:rPr lang="fr-FR" smtClean="0"/>
+              <a:rPr lang="fr-FR"/>
               <a:t>Modifiez le style du titre</a:t>
             </a:r>
             <a:endParaRPr lang="en-US" dirty="0"/>
@@ -2182,7 +2182,7 @@
           <a:p>
             <a:pPr lvl="0"/>
             <a:r>
-              <a:rPr lang="fr-FR" smtClean="0"/>
+              <a:rPr lang="fr-FR"/>
               <a:t>Modifiez les styles du texte du masque</a:t>
             </a:r>
           </a:p>
@@ -2260,7 +2260,7 @@
           </a:lstStyle>
           <a:p>
             <a:r>
-              <a:rPr lang="fr-FR" smtClean="0"/>
+              <a:rPr lang="fr-FR"/>
               <a:t>Cliquez sur l'icône pour ajouter une image</a:t>
             </a:r>
             <a:endParaRPr lang="en-US" dirty="0"/>
@@ -2328,7 +2328,7 @@
           <a:p>
             <a:pPr lvl="0"/>
             <a:r>
-              <a:rPr lang="fr-FR" smtClean="0"/>
+              <a:rPr lang="fr-FR"/>
               <a:t>Modifiez les styles du texte du masque</a:t>
             </a:r>
           </a:p>
@@ -2402,7 +2402,7 @@
           <a:p>
             <a:pPr lvl="0"/>
             <a:r>
-              <a:rPr lang="fr-FR" smtClean="0"/>
+              <a:rPr lang="fr-FR"/>
               <a:t>Modifiez les styles du texte du masque</a:t>
             </a:r>
           </a:p>
@@ -2480,7 +2480,7 @@
           </a:lstStyle>
           <a:p>
             <a:r>
-              <a:rPr lang="fr-FR" smtClean="0"/>
+              <a:rPr lang="fr-FR"/>
               <a:t>Cliquez sur l'icône pour ajouter une image</a:t>
             </a:r>
             <a:endParaRPr lang="en-US" dirty="0"/>
@@ -2548,7 +2548,7 @@
           <a:p>
             <a:pPr lvl="0"/>
             <a:r>
-              <a:rPr lang="fr-FR" smtClean="0"/>
+              <a:rPr lang="fr-FR"/>
               <a:t>Modifiez les styles du texte du masque</a:t>
             </a:r>
           </a:p>
@@ -2622,7 +2622,7 @@
           <a:p>
             <a:pPr lvl="0"/>
             <a:r>
-              <a:rPr lang="fr-FR" smtClean="0"/>
+              <a:rPr lang="fr-FR"/>
               <a:t>Modifiez les styles du texte du masque</a:t>
             </a:r>
           </a:p>
@@ -2700,7 +2700,7 @@
           </a:lstStyle>
           <a:p>
             <a:r>
-              <a:rPr lang="fr-FR" smtClean="0"/>
+              <a:rPr lang="fr-FR"/>
               <a:t>Cliquez sur l'icône pour ajouter une image</a:t>
             </a:r>
             <a:endParaRPr lang="en-US" dirty="0"/>
@@ -2768,7 +2768,7 @@
           <a:p>
             <a:pPr lvl="0"/>
             <a:r>
-              <a:rPr lang="fr-FR" smtClean="0"/>
+              <a:rPr lang="fr-FR"/>
               <a:t>Modifiez les styles du texte du masque</a:t>
             </a:r>
           </a:p>
@@ -2869,7 +2869,7 @@
           <a:p>
             <a:fld id="{57623296-6700-4D43-8DD2-BC28E9463D46}" type="datetimeFigureOut">
               <a:rPr lang="fr-FR" smtClean="0"/>
-              <a:t>01/03/2024</a:t>
+              <a:t>12/03/2024</a:t>
             </a:fld>
             <a:endParaRPr lang="fr-FR"/>
           </a:p>
@@ -2963,7 +2963,7 @@
           <a:lstStyle/>
           <a:p>
             <a:r>
-              <a:rPr lang="fr-FR" smtClean="0"/>
+              <a:rPr lang="fr-FR"/>
               <a:t>Modifiez le style du titre</a:t>
             </a:r>
             <a:endParaRPr lang="en-US" dirty="0"/>
@@ -2987,35 +2987,35 @@
           <a:p>
             <a:pPr lvl="0"/>
             <a:r>
-              <a:rPr lang="fr-FR" smtClean="0"/>
+              <a:rPr lang="fr-FR"/>
               <a:t>Modifiez les styles du texte du masque</a:t>
             </a:r>
           </a:p>
           <a:p>
             <a:pPr lvl="1"/>
             <a:r>
-              <a:rPr lang="fr-FR" smtClean="0"/>
+              <a:rPr lang="fr-FR"/>
               <a:t>Deuxième niveau</a:t>
             </a:r>
           </a:p>
           <a:p>
             <a:pPr lvl="2"/>
             <a:r>
-              <a:rPr lang="fr-FR" smtClean="0"/>
+              <a:rPr lang="fr-FR"/>
               <a:t>Troisième niveau</a:t>
             </a:r>
           </a:p>
           <a:p>
             <a:pPr lvl="3"/>
             <a:r>
-              <a:rPr lang="fr-FR" smtClean="0"/>
+              <a:rPr lang="fr-FR"/>
               <a:t>Quatrième niveau</a:t>
             </a:r>
           </a:p>
           <a:p>
             <a:pPr lvl="4"/>
             <a:r>
-              <a:rPr lang="fr-FR" smtClean="0"/>
+              <a:rPr lang="fr-FR"/>
               <a:t>Cinquième niveau</a:t>
             </a:r>
             <a:endParaRPr lang="en-US" dirty="0"/>
@@ -3039,7 +3039,7 @@
           <a:p>
             <a:fld id="{57623296-6700-4D43-8DD2-BC28E9463D46}" type="datetimeFigureOut">
               <a:rPr lang="fr-FR" smtClean="0"/>
-              <a:t>01/03/2024</a:t>
+              <a:t>12/03/2024</a:t>
             </a:fld>
             <a:endParaRPr lang="fr-FR"/>
           </a:p>
@@ -3138,7 +3138,7 @@
           <a:lstStyle/>
           <a:p>
             <a:r>
-              <a:rPr lang="fr-FR" smtClean="0"/>
+              <a:rPr lang="fr-FR"/>
               <a:t>Modifiez le style du titre</a:t>
             </a:r>
             <a:endParaRPr lang="en-US" dirty="0"/>
@@ -3167,35 +3167,35 @@
           <a:p>
             <a:pPr lvl="0"/>
             <a:r>
-              <a:rPr lang="fr-FR" smtClean="0"/>
+              <a:rPr lang="fr-FR"/>
               <a:t>Modifiez les styles du texte du masque</a:t>
             </a:r>
           </a:p>
           <a:p>
             <a:pPr lvl="1"/>
             <a:r>
-              <a:rPr lang="fr-FR" smtClean="0"/>
+              <a:rPr lang="fr-FR"/>
               <a:t>Deuxième niveau</a:t>
             </a:r>
           </a:p>
           <a:p>
             <a:pPr lvl="2"/>
             <a:r>
-              <a:rPr lang="fr-FR" smtClean="0"/>
+              <a:rPr lang="fr-FR"/>
               <a:t>Troisième niveau</a:t>
             </a:r>
           </a:p>
           <a:p>
             <a:pPr lvl="3"/>
             <a:r>
-              <a:rPr lang="fr-FR" smtClean="0"/>
+              <a:rPr lang="fr-FR"/>
               <a:t>Quatrième niveau</a:t>
             </a:r>
           </a:p>
           <a:p>
             <a:pPr lvl="4"/>
             <a:r>
-              <a:rPr lang="fr-FR" smtClean="0"/>
+              <a:rPr lang="fr-FR"/>
               <a:t>Cinquième niveau</a:t>
             </a:r>
             <a:endParaRPr lang="en-US" dirty="0"/>
@@ -3219,7 +3219,7 @@
           <a:p>
             <a:fld id="{57623296-6700-4D43-8DD2-BC28E9463D46}" type="datetimeFigureOut">
               <a:rPr lang="fr-FR" smtClean="0"/>
-              <a:t>01/03/2024</a:t>
+              <a:t>12/03/2024</a:t>
             </a:fld>
             <a:endParaRPr lang="fr-FR"/>
           </a:p>
@@ -3313,7 +3313,7 @@
           <a:lstStyle/>
           <a:p>
             <a:r>
-              <a:rPr lang="fr-FR" smtClean="0"/>
+              <a:rPr lang="fr-FR"/>
               <a:t>Modifiez le style du titre</a:t>
             </a:r>
             <a:endParaRPr lang="en-US" dirty="0"/>
@@ -3337,35 +3337,35 @@
           <a:p>
             <a:pPr lvl="0"/>
             <a:r>
-              <a:rPr lang="fr-FR" smtClean="0"/>
+              <a:rPr lang="fr-FR"/>
               <a:t>Modifiez les styles du texte du masque</a:t>
             </a:r>
           </a:p>
           <a:p>
             <a:pPr lvl="1"/>
             <a:r>
-              <a:rPr lang="fr-FR" smtClean="0"/>
+              <a:rPr lang="fr-FR"/>
               <a:t>Deuxième niveau</a:t>
             </a:r>
           </a:p>
           <a:p>
             <a:pPr lvl="2"/>
             <a:r>
-              <a:rPr lang="fr-FR" smtClean="0"/>
+              <a:rPr lang="fr-FR"/>
               <a:t>Troisième niveau</a:t>
             </a:r>
           </a:p>
           <a:p>
             <a:pPr lvl="3"/>
             <a:r>
-              <a:rPr lang="fr-FR" smtClean="0"/>
+              <a:rPr lang="fr-FR"/>
               <a:t>Quatrième niveau</a:t>
             </a:r>
           </a:p>
           <a:p>
             <a:pPr lvl="4"/>
             <a:r>
-              <a:rPr lang="fr-FR" smtClean="0"/>
+              <a:rPr lang="fr-FR"/>
               <a:t>Cinquième niveau</a:t>
             </a:r>
             <a:endParaRPr lang="en-US" dirty="0"/>
@@ -3389,7 +3389,7 @@
           <a:p>
             <a:fld id="{57623296-6700-4D43-8DD2-BC28E9463D46}" type="datetimeFigureOut">
               <a:rPr lang="fr-FR" smtClean="0"/>
-              <a:t>01/03/2024</a:t>
+              <a:t>12/03/2024</a:t>
             </a:fld>
             <a:endParaRPr lang="fr-FR"/>
           </a:p>
@@ -3492,7 +3492,7 @@
           </a:lstStyle>
           <a:p>
             <a:r>
-              <a:rPr lang="fr-FR" smtClean="0"/>
+              <a:rPr lang="fr-FR"/>
               <a:t>Modifiez le style du titre</a:t>
             </a:r>
             <a:endParaRPr lang="en-US" dirty="0"/>
@@ -3613,7 +3613,7 @@
           <a:p>
             <a:pPr lvl="0"/>
             <a:r>
-              <a:rPr lang="fr-FR" smtClean="0"/>
+              <a:rPr lang="fr-FR"/>
               <a:t>Modifiez les styles du texte du masque</a:t>
             </a:r>
           </a:p>
@@ -3636,7 +3636,7 @@
           <a:p>
             <a:fld id="{57623296-6700-4D43-8DD2-BC28E9463D46}" type="datetimeFigureOut">
               <a:rPr lang="fr-FR" smtClean="0"/>
-              <a:t>01/03/2024</a:t>
+              <a:t>12/03/2024</a:t>
             </a:fld>
             <a:endParaRPr lang="fr-FR"/>
           </a:p>
@@ -3730,7 +3730,7 @@
           <a:lstStyle/>
           <a:p>
             <a:r>
-              <a:rPr lang="fr-FR" smtClean="0"/>
+              <a:rPr lang="fr-FR"/>
               <a:t>Modifiez le style du titre</a:t>
             </a:r>
             <a:endParaRPr lang="en-US" dirty="0"/>
@@ -3789,35 +3789,35 @@
           <a:p>
             <a:pPr lvl="0"/>
             <a:r>
-              <a:rPr lang="fr-FR" smtClean="0"/>
+              <a:rPr lang="fr-FR"/>
               <a:t>Modifiez les styles du texte du masque</a:t>
             </a:r>
           </a:p>
           <a:p>
             <a:pPr lvl="1"/>
             <a:r>
-              <a:rPr lang="fr-FR" smtClean="0"/>
+              <a:rPr lang="fr-FR"/>
               <a:t>Deuxième niveau</a:t>
             </a:r>
           </a:p>
           <a:p>
             <a:pPr lvl="2"/>
             <a:r>
-              <a:rPr lang="fr-FR" smtClean="0"/>
+              <a:rPr lang="fr-FR"/>
               <a:t>Troisième niveau</a:t>
             </a:r>
           </a:p>
           <a:p>
             <a:pPr lvl="3"/>
             <a:r>
-              <a:rPr lang="fr-FR" smtClean="0"/>
+              <a:rPr lang="fr-FR"/>
               <a:t>Quatrième niveau</a:t>
             </a:r>
           </a:p>
           <a:p>
             <a:pPr lvl="4"/>
             <a:r>
-              <a:rPr lang="fr-FR" smtClean="0"/>
+              <a:rPr lang="fr-FR"/>
               <a:t>Cinquième niveau</a:t>
             </a:r>
             <a:endParaRPr lang="en-US" dirty="0"/>
@@ -3876,35 +3876,35 @@
           <a:p>
             <a:pPr lvl="0"/>
             <a:r>
-              <a:rPr lang="fr-FR" smtClean="0"/>
+              <a:rPr lang="fr-FR"/>
               <a:t>Modifiez les styles du texte du masque</a:t>
             </a:r>
           </a:p>
           <a:p>
             <a:pPr lvl="1"/>
             <a:r>
-              <a:rPr lang="fr-FR" smtClean="0"/>
+              <a:rPr lang="fr-FR"/>
               <a:t>Deuxième niveau</a:t>
             </a:r>
           </a:p>
           <a:p>
             <a:pPr lvl="2"/>
             <a:r>
-              <a:rPr lang="fr-FR" smtClean="0"/>
+              <a:rPr lang="fr-FR"/>
               <a:t>Troisième niveau</a:t>
             </a:r>
           </a:p>
           <a:p>
             <a:pPr lvl="3"/>
             <a:r>
-              <a:rPr lang="fr-FR" smtClean="0"/>
+              <a:rPr lang="fr-FR"/>
               <a:t>Quatrième niveau</a:t>
             </a:r>
           </a:p>
           <a:p>
             <a:pPr lvl="4"/>
             <a:r>
-              <a:rPr lang="fr-FR" smtClean="0"/>
+              <a:rPr lang="fr-FR"/>
               <a:t>Cinquième niveau</a:t>
             </a:r>
             <a:endParaRPr lang="en-US" dirty="0"/>
@@ -3928,7 +3928,7 @@
           <a:p>
             <a:fld id="{57623296-6700-4D43-8DD2-BC28E9463D46}" type="datetimeFigureOut">
               <a:rPr lang="fr-FR" smtClean="0"/>
-              <a:t>01/03/2024</a:t>
+              <a:t>12/03/2024</a:t>
             </a:fld>
             <a:endParaRPr lang="fr-FR"/>
           </a:p>
@@ -4026,7 +4026,7 @@
           </a:lstStyle>
           <a:p>
             <a:r>
-              <a:rPr lang="fr-FR" smtClean="0"/>
+              <a:rPr lang="fr-FR"/>
               <a:t>Modifiez le style du titre</a:t>
             </a:r>
             <a:endParaRPr lang="en-US" dirty="0"/>
@@ -4101,7 +4101,7 @@
           <a:p>
             <a:pPr lvl="0"/>
             <a:r>
-              <a:rPr lang="fr-FR" smtClean="0"/>
+              <a:rPr lang="fr-FR"/>
               <a:t>Modifiez les styles du texte du masque</a:t>
             </a:r>
           </a:p>
@@ -4159,35 +4159,35 @@
           <a:p>
             <a:pPr lvl="0"/>
             <a:r>
-              <a:rPr lang="fr-FR" smtClean="0"/>
+              <a:rPr lang="fr-FR"/>
               <a:t>Modifiez les styles du texte du masque</a:t>
             </a:r>
           </a:p>
           <a:p>
             <a:pPr lvl="1"/>
             <a:r>
-              <a:rPr lang="fr-FR" smtClean="0"/>
+              <a:rPr lang="fr-FR"/>
               <a:t>Deuxième niveau</a:t>
             </a:r>
           </a:p>
           <a:p>
             <a:pPr lvl="2"/>
             <a:r>
-              <a:rPr lang="fr-FR" smtClean="0"/>
+              <a:rPr lang="fr-FR"/>
               <a:t>Troisième niveau</a:t>
             </a:r>
           </a:p>
           <a:p>
             <a:pPr lvl="3"/>
             <a:r>
-              <a:rPr lang="fr-FR" smtClean="0"/>
+              <a:rPr lang="fr-FR"/>
               <a:t>Quatrième niveau</a:t>
             </a:r>
           </a:p>
           <a:p>
             <a:pPr lvl="4"/>
             <a:r>
-              <a:rPr lang="fr-FR" smtClean="0"/>
+              <a:rPr lang="fr-FR"/>
               <a:t>Cinquième niveau</a:t>
             </a:r>
             <a:endParaRPr lang="en-US" dirty="0"/>
@@ -4262,7 +4262,7 @@
           <a:p>
             <a:pPr lvl="0"/>
             <a:r>
-              <a:rPr lang="fr-FR" smtClean="0"/>
+              <a:rPr lang="fr-FR"/>
               <a:t>Modifiez les styles du texte du masque</a:t>
             </a:r>
           </a:p>
@@ -4320,35 +4320,35 @@
           <a:p>
             <a:pPr lvl="0"/>
             <a:r>
-              <a:rPr lang="fr-FR" smtClean="0"/>
+              <a:rPr lang="fr-FR"/>
               <a:t>Modifiez les styles du texte du masque</a:t>
             </a:r>
           </a:p>
           <a:p>
             <a:pPr lvl="1"/>
             <a:r>
-              <a:rPr lang="fr-FR" smtClean="0"/>
+              <a:rPr lang="fr-FR"/>
               <a:t>Deuxième niveau</a:t>
             </a:r>
           </a:p>
           <a:p>
             <a:pPr lvl="2"/>
             <a:r>
-              <a:rPr lang="fr-FR" smtClean="0"/>
+              <a:rPr lang="fr-FR"/>
               <a:t>Troisième niveau</a:t>
             </a:r>
           </a:p>
           <a:p>
             <a:pPr lvl="3"/>
             <a:r>
-              <a:rPr lang="fr-FR" smtClean="0"/>
+              <a:rPr lang="fr-FR"/>
               <a:t>Quatrième niveau</a:t>
             </a:r>
           </a:p>
           <a:p>
             <a:pPr lvl="4"/>
             <a:r>
-              <a:rPr lang="fr-FR" smtClean="0"/>
+              <a:rPr lang="fr-FR"/>
               <a:t>Cinquième niveau</a:t>
             </a:r>
             <a:endParaRPr lang="en-US" dirty="0"/>
@@ -4372,7 +4372,7 @@
           <a:p>
             <a:fld id="{57623296-6700-4D43-8DD2-BC28E9463D46}" type="datetimeFigureOut">
               <a:rPr lang="fr-FR" smtClean="0"/>
-              <a:t>01/03/2024</a:t>
+              <a:t>12/03/2024</a:t>
             </a:fld>
             <a:endParaRPr lang="fr-FR"/>
           </a:p>
@@ -4466,7 +4466,7 @@
           <a:lstStyle/>
           <a:p>
             <a:r>
-              <a:rPr lang="fr-FR" smtClean="0"/>
+              <a:rPr lang="fr-FR"/>
               <a:t>Modifiez le style du titre</a:t>
             </a:r>
             <a:endParaRPr lang="en-US" dirty="0"/>
@@ -4490,7 +4490,7 @@
           <a:p>
             <a:fld id="{57623296-6700-4D43-8DD2-BC28E9463D46}" type="datetimeFigureOut">
               <a:rPr lang="fr-FR" smtClean="0"/>
-              <a:t>01/03/2024</a:t>
+              <a:t>12/03/2024</a:t>
             </a:fld>
             <a:endParaRPr lang="fr-FR"/>
           </a:p>
@@ -4585,7 +4585,7 @@
           <a:p>
             <a:fld id="{57623296-6700-4D43-8DD2-BC28E9463D46}" type="datetimeFigureOut">
               <a:rPr lang="fr-FR" smtClean="0"/>
-              <a:t>01/03/2024</a:t>
+              <a:t>12/03/2024</a:t>
             </a:fld>
             <a:endParaRPr lang="fr-FR"/>
           </a:p>
@@ -4688,7 +4688,7 @@
           </a:lstStyle>
           <a:p>
             <a:r>
-              <a:rPr lang="fr-FR" smtClean="0"/>
+              <a:rPr lang="fr-FR"/>
               <a:t>Modifiez le style du titre</a:t>
             </a:r>
             <a:endParaRPr lang="en-US" dirty="0"/>
@@ -4747,35 +4747,35 @@
           <a:p>
             <a:pPr lvl="0"/>
             <a:r>
-              <a:rPr lang="fr-FR" smtClean="0"/>
+              <a:rPr lang="fr-FR"/>
               <a:t>Modifiez les styles du texte du masque</a:t>
             </a:r>
           </a:p>
           <a:p>
             <a:pPr lvl="1"/>
             <a:r>
-              <a:rPr lang="fr-FR" smtClean="0"/>
+              <a:rPr lang="fr-FR"/>
               <a:t>Deuxième niveau</a:t>
             </a:r>
           </a:p>
           <a:p>
             <a:pPr lvl="2"/>
             <a:r>
-              <a:rPr lang="fr-FR" smtClean="0"/>
+              <a:rPr lang="fr-FR"/>
               <a:t>Troisième niveau</a:t>
             </a:r>
           </a:p>
           <a:p>
             <a:pPr lvl="3"/>
             <a:r>
-              <a:rPr lang="fr-FR" smtClean="0"/>
+              <a:rPr lang="fr-FR"/>
               <a:t>Quatrième niveau</a:t>
             </a:r>
           </a:p>
           <a:p>
             <a:pPr lvl="4"/>
             <a:r>
-              <a:rPr lang="fr-FR" smtClean="0"/>
+              <a:rPr lang="fr-FR"/>
               <a:t>Cinquième niveau</a:t>
             </a:r>
             <a:endParaRPr lang="en-US" dirty="0"/>
@@ -4841,7 +4841,7 @@
           <a:p>
             <a:pPr lvl="0"/>
             <a:r>
-              <a:rPr lang="fr-FR" smtClean="0"/>
+              <a:rPr lang="fr-FR"/>
               <a:t>Modifiez les styles du texte du masque</a:t>
             </a:r>
           </a:p>
@@ -4864,7 +4864,7 @@
           <a:p>
             <a:fld id="{57623296-6700-4D43-8DD2-BC28E9463D46}" type="datetimeFigureOut">
               <a:rPr lang="fr-FR" smtClean="0"/>
-              <a:t>01/03/2024</a:t>
+              <a:t>12/03/2024</a:t>
             </a:fld>
             <a:endParaRPr lang="fr-FR"/>
           </a:p>
@@ -4969,7 +4969,7 @@
           </a:lstStyle>
           <a:p>
             <a:r>
-              <a:rPr lang="fr-FR" smtClean="0"/>
+              <a:rPr lang="fr-FR"/>
               <a:t>Modifiez le style du titre</a:t>
             </a:r>
             <a:endParaRPr lang="en-US" dirty="0"/>
@@ -5048,7 +5048,7 @@
           </a:lstStyle>
           <a:p>
             <a:r>
-              <a:rPr lang="fr-FR" smtClean="0"/>
+              <a:rPr lang="fr-FR"/>
               <a:t>Cliquez sur l'icône pour ajouter une image</a:t>
             </a:r>
             <a:endParaRPr lang="en-US" dirty="0"/>
@@ -5116,7 +5116,7 @@
           <a:p>
             <a:pPr lvl="0"/>
             <a:r>
-              <a:rPr lang="fr-FR" smtClean="0"/>
+              <a:rPr lang="fr-FR"/>
               <a:t>Modifiez les styles du texte du masque</a:t>
             </a:r>
           </a:p>
@@ -5139,7 +5139,7 @@
           <a:p>
             <a:fld id="{57623296-6700-4D43-8DD2-BC28E9463D46}" type="datetimeFigureOut">
               <a:rPr lang="fr-FR" smtClean="0"/>
-              <a:t>01/03/2024</a:t>
+              <a:t>12/03/2024</a:t>
             </a:fld>
             <a:endParaRPr lang="fr-FR"/>
           </a:p>
@@ -5463,7 +5463,7 @@
           <a:lstStyle/>
           <a:p>
             <a:r>
-              <a:rPr lang="fr-FR" smtClean="0"/>
+              <a:rPr lang="fr-FR"/>
               <a:t>Modifiez le style du titre</a:t>
             </a:r>
             <a:endParaRPr lang="en-US" dirty="0"/>
@@ -5497,35 +5497,35 @@
           <a:p>
             <a:pPr lvl="0"/>
             <a:r>
-              <a:rPr lang="fr-FR" smtClean="0"/>
+              <a:rPr lang="fr-FR"/>
               <a:t>Modifiez les styles du texte du masque</a:t>
             </a:r>
           </a:p>
           <a:p>
             <a:pPr lvl="1"/>
             <a:r>
-              <a:rPr lang="fr-FR" smtClean="0"/>
+              <a:rPr lang="fr-FR"/>
               <a:t>Deuxième niveau</a:t>
             </a:r>
           </a:p>
           <a:p>
             <a:pPr lvl="2"/>
             <a:r>
-              <a:rPr lang="fr-FR" smtClean="0"/>
+              <a:rPr lang="fr-FR"/>
               <a:t>Troisième niveau</a:t>
             </a:r>
           </a:p>
           <a:p>
             <a:pPr lvl="3"/>
             <a:r>
-              <a:rPr lang="fr-FR" smtClean="0"/>
+              <a:rPr lang="fr-FR"/>
               <a:t>Quatrième niveau</a:t>
             </a:r>
           </a:p>
           <a:p>
             <a:pPr lvl="4"/>
             <a:r>
-              <a:rPr lang="fr-FR" smtClean="0"/>
+              <a:rPr lang="fr-FR"/>
               <a:t>Cinquième niveau</a:t>
             </a:r>
             <a:endParaRPr lang="en-US" dirty="0"/>
@@ -5568,7 +5568,7 @@
           <a:p>
             <a:fld id="{57623296-6700-4D43-8DD2-BC28E9463D46}" type="datetimeFigureOut">
               <a:rPr lang="fr-FR" smtClean="0"/>
-              <a:t>01/03/2024</a:t>
+              <a:t>12/03/2024</a:t>
             </a:fld>
             <a:endParaRPr lang="fr-FR"/>
           </a:p>
@@ -6131,10 +6131,9 @@
           <a:p>
             <a:pPr algn="ctr"/>
             <a:r>
-              <a:rPr lang="fr-FR" dirty="0" smtClean="0"/>
+              <a:rPr lang="fr-FR" dirty="0"/>
               <a:t>LOGO</a:t>
             </a:r>
-            <a:endParaRPr lang="fr-FR" dirty="0"/>
           </a:p>
         </p:txBody>
       </p:sp>
@@ -6188,14 +6187,11 @@
           <a:p>
             <a:pPr algn="ctr"/>
             <a:r>
-              <a:rPr lang="fr-FR" sz="9600" dirty="0" smtClean="0">
+              <a:rPr lang="fr-FR" sz="9600" dirty="0">
                 <a:latin typeface="Arial Black" panose="020B0A04020102020204" pitchFamily="34" charset="0"/>
               </a:rPr>
               <a:t>DreamGLow</a:t>
             </a:r>
-            <a:endParaRPr lang="fr-FR" sz="9600" dirty="0">
-              <a:latin typeface="Arial Black" panose="020B0A04020102020204" pitchFamily="34" charset="0"/>
-            </a:endParaRPr>
           </a:p>
         </p:txBody>
       </p:sp>
@@ -6223,14 +6219,11 @@
           <a:p>
             <a:pPr algn="ctr"/>
             <a:r>
-              <a:rPr lang="fr-FR" dirty="0" smtClean="0">
+              <a:rPr lang="fr-FR" dirty="0">
                 <a:latin typeface="Bahnschrift Light" panose="020B0502040204020203" pitchFamily="34" charset="0"/>
               </a:rPr>
               <a:t>Explorez le théâtre sous une nouvelle lumière avec DreamGlow. Joignez-vous à nous pour une aventure artistique unique, où chaque acte est une célébration de la créativité.</a:t>
             </a:r>
-            <a:endParaRPr lang="fr-FR" dirty="0">
-              <a:latin typeface="Bahnschrift Light" panose="020B0502040204020203" pitchFamily="34" charset="0"/>
-            </a:endParaRPr>
           </a:p>
         </p:txBody>
       </p:sp>
@@ -6242,8 +6235,8 @@
         </p:nvSpPr>
         <p:spPr>
           <a:xfrm>
-            <a:off x="4601780" y="136110"/>
-            <a:ext cx="5066226" cy="646331"/>
+            <a:off x="11212630" y="1281642"/>
+            <a:ext cx="785406" cy="3693319"/>
           </a:xfrm>
           <a:prstGeom prst="rect">
             <a:avLst/>
@@ -6263,10 +6256,9 @@
           <a:p>
             <a:pPr algn="ctr"/>
             <a:r>
-              <a:rPr lang="fr-FR" dirty="0" smtClean="0"/>
+              <a:rPr lang="fr-FR" dirty="0"/>
               <a:t>Logo et lien vers les réseaux sociaux de la compagnie</a:t>
             </a:r>
-            <a:endParaRPr lang="fr-FR" dirty="0"/>
           </a:p>
         </p:txBody>
       </p:sp>
@@ -6293,10 +6285,9 @@
           <a:lstStyle/>
           <a:p>
             <a:r>
-              <a:rPr lang="fr-FR" dirty="0" smtClean="0"/>
+              <a:rPr lang="fr-FR" dirty="0"/>
               <a:t>Menu déroulante</a:t>
             </a:r>
-            <a:endParaRPr lang="fr-FR" dirty="0"/>
           </a:p>
         </p:txBody>
       </p:sp>
@@ -6354,10 +6345,9 @@
           <a:p>
             <a:pPr algn="ctr"/>
             <a:r>
-              <a:rPr lang="fr-FR" sz="9600" dirty="0" smtClean="0"/>
+              <a:rPr lang="fr-FR" sz="9600" dirty="0"/>
               <a:t>Image ou visuel représentatif du théâtre, </a:t>
             </a:r>
-            <a:endParaRPr lang="fr-FR" sz="9600" dirty="0"/>
           </a:p>
         </p:txBody>
       </p:sp>
@@ -6426,10 +6416,9 @@
           <a:p>
             <a:pPr algn="ctr"/>
             <a:r>
-              <a:rPr lang="fr-FR" dirty="0" smtClean="0"/>
+              <a:rPr lang="fr-FR" dirty="0"/>
               <a:t>Photo des acteurs</a:t>
             </a:r>
-            <a:endParaRPr lang="fr-FR" dirty="0"/>
           </a:p>
         </p:txBody>
       </p:sp>
@@ -6456,10 +6445,9 @@
           <a:lstStyle/>
           <a:p>
             <a:r>
-              <a:rPr lang="fr-FR" dirty="0" smtClean="0"/>
+              <a:rPr lang="fr-FR" dirty="0"/>
               <a:t>Nos acteurs</a:t>
             </a:r>
-            <a:endParaRPr lang="fr-FR" dirty="0"/>
           </a:p>
         </p:txBody>
       </p:sp>
@@ -6490,10 +6478,9 @@
           <a:lstStyle/>
           <a:p>
             <a:r>
-              <a:rPr lang="fr-FR" dirty="0" smtClean="0"/>
+              <a:rPr lang="fr-FR" dirty="0"/>
               <a:t>Découvrir maintenant</a:t>
             </a:r>
-            <a:endParaRPr lang="fr-FR" dirty="0"/>
           </a:p>
         </p:txBody>
       </p:sp>
@@ -6562,10 +6549,9 @@
           <a:p>
             <a:pPr algn="ctr"/>
             <a:r>
-              <a:rPr lang="fr-FR" dirty="0" smtClean="0"/>
+              <a:rPr lang="fr-FR" dirty="0"/>
               <a:t>Photo représentatif de notre dernière performance</a:t>
             </a:r>
-            <a:endParaRPr lang="fr-FR" dirty="0"/>
           </a:p>
         </p:txBody>
       </p:sp>
@@ -6592,10 +6578,9 @@
           <a:lstStyle/>
           <a:p>
             <a:r>
-              <a:rPr lang="fr-FR" dirty="0" smtClean="0"/>
+              <a:rPr lang="fr-FR" dirty="0"/>
               <a:t>Notre dernière performance</a:t>
             </a:r>
-            <a:endParaRPr lang="fr-FR" dirty="0"/>
           </a:p>
         </p:txBody>
       </p:sp>
@@ -6688,10 +6673,9 @@
           <a:p>
             <a:pPr algn="ctr"/>
             <a:r>
-              <a:rPr lang="fr-FR" dirty="0" smtClean="0"/>
+              <a:rPr lang="fr-FR" dirty="0"/>
               <a:t>Photo représentatif du prochain show</a:t>
             </a:r>
-            <a:endParaRPr lang="fr-FR" dirty="0"/>
           </a:p>
         </p:txBody>
       </p:sp>
@@ -6718,10 +6702,9 @@
           <a:lstStyle/>
           <a:p>
             <a:r>
-              <a:rPr lang="fr-FR" dirty="0" smtClean="0"/>
+              <a:rPr lang="fr-FR" dirty="0"/>
               <a:t>Notre prochain show</a:t>
             </a:r>
-            <a:endParaRPr lang="fr-FR" dirty="0"/>
           </a:p>
         </p:txBody>
       </p:sp>
@@ -6826,10 +6809,9 @@
           <a:lstStyle/>
           <a:p>
             <a:r>
-              <a:rPr lang="fr-FR" dirty="0" smtClean="0"/>
+              <a:rPr lang="fr-FR" dirty="0"/>
               <a:t>Adresse</a:t>
             </a:r>
-            <a:endParaRPr lang="fr-FR" dirty="0"/>
           </a:p>
         </p:txBody>
       </p:sp>
@@ -6856,10 +6838,9 @@
           <a:lstStyle/>
           <a:p>
             <a:r>
-              <a:rPr lang="fr-FR" dirty="0" smtClean="0"/>
+              <a:rPr lang="fr-FR" dirty="0"/>
               <a:t>E-mail</a:t>
             </a:r>
-            <a:endParaRPr lang="fr-FR" dirty="0"/>
           </a:p>
         </p:txBody>
       </p:sp>
@@ -6886,10 +6867,9 @@
           <a:lstStyle/>
           <a:p>
             <a:r>
-              <a:rPr lang="fr-FR" dirty="0" smtClean="0"/>
+              <a:rPr lang="fr-FR" dirty="0"/>
               <a:t>Contactez-nous</a:t>
             </a:r>
-            <a:endParaRPr lang="fr-FR" dirty="0"/>
           </a:p>
         </p:txBody>
       </p:sp>
@@ -6921,10 +6901,9 @@
           <a:lstStyle/>
           <a:p>
             <a:r>
-              <a:rPr lang="fr-FR" dirty="0" smtClean="0"/>
+              <a:rPr lang="fr-FR" dirty="0"/>
               <a:t>Votre nom</a:t>
             </a:r>
-            <a:endParaRPr lang="fr-FR" dirty="0"/>
           </a:p>
         </p:txBody>
       </p:sp>
@@ -6956,10 +6935,9 @@
           <a:lstStyle/>
           <a:p>
             <a:r>
-              <a:rPr lang="fr-FR" dirty="0" smtClean="0"/>
+              <a:rPr lang="fr-FR" dirty="0"/>
               <a:t>E-mail</a:t>
             </a:r>
-            <a:endParaRPr lang="fr-FR" dirty="0"/>
           </a:p>
         </p:txBody>
       </p:sp>
@@ -6991,7 +6969,7 @@
           <a:lstStyle/>
           <a:p>
             <a:r>
-              <a:rPr lang="fr-FR" dirty="0" smtClean="0"/>
+              <a:rPr lang="fr-FR" dirty="0"/>
               <a:t>Message</a:t>
             </a:r>
           </a:p>
@@ -6999,13 +6977,13 @@
             <a:endParaRPr lang="fr-FR" dirty="0"/>
           </a:p>
           <a:p>
-            <a:endParaRPr lang="fr-FR" dirty="0" smtClean="0"/>
-          </a:p>
-          <a:p>
             <a:endParaRPr lang="fr-FR" dirty="0"/>
           </a:p>
           <a:p>
-            <a:endParaRPr lang="fr-FR" dirty="0" smtClean="0"/>
+            <a:endParaRPr lang="fr-FR" dirty="0"/>
+          </a:p>
+          <a:p>
+            <a:endParaRPr lang="fr-FR" dirty="0"/>
           </a:p>
           <a:p>
             <a:endParaRPr lang="fr-FR" dirty="0"/>
@@ -7035,10 +7013,9 @@
           <a:lstStyle/>
           <a:p>
             <a:r>
-              <a:rPr lang="fr-FR" dirty="0" smtClean="0"/>
+              <a:rPr lang="fr-FR" dirty="0"/>
               <a:t>Newsletter</a:t>
             </a:r>
-            <a:endParaRPr lang="fr-FR" dirty="0"/>
           </a:p>
         </p:txBody>
       </p:sp>
@@ -7065,10 +7042,9 @@
           <a:lstStyle/>
           <a:p>
             <a:r>
-              <a:rPr lang="fr-FR" dirty="0" smtClean="0"/>
+              <a:rPr lang="fr-FR" dirty="0"/>
               <a:t>Restez informé en entrant votre e-mail ici </a:t>
             </a:r>
-            <a:endParaRPr lang="fr-FR" dirty="0"/>
           </a:p>
         </p:txBody>
       </p:sp>
@@ -7135,10 +7111,9 @@
           <a:lstStyle/>
           <a:p>
             <a:r>
-              <a:rPr lang="fr-FR" dirty="0" smtClean="0"/>
+              <a:rPr lang="fr-FR" dirty="0"/>
               <a:t>S’abonner</a:t>
             </a:r>
-            <a:endParaRPr lang="fr-FR" dirty="0"/>
           </a:p>
         </p:txBody>
       </p:sp>

</xml_diff>